<commit_message>
added the custom model
</commit_message>
<xml_diff>
--- a/MidPresentation/S17355 - Research Mid Presentation.pptx
+++ b/MidPresentation/S17355 - Research Mid Presentation.pptx
@@ -4,6 +4,9 @@
   <p:sldMasterIdLst>
     <p:sldMasterId id="2147483712" r:id="rId1"/>
   </p:sldMasterIdLst>
+  <p:notesMasterIdLst>
+    <p:notesMasterId r:id="rId14"/>
+  </p:notesMasterIdLst>
   <p:sldIdLst>
     <p:sldId id="256" r:id="rId2"/>
     <p:sldId id="257" r:id="rId3"/>
@@ -115,6 +118,11 @@
       </a:defRPr>
     </a:lvl9pPr>
   </p:defaultTextStyle>
+  <p:extLst>
+    <p:ext uri="{EFAFB233-063F-42B5-8137-9DF3F51BA10A}">
+      <p15:sldGuideLst xmlns:p15="http://schemas.microsoft.com/office/powerpoint/2012/main"/>
+    </p:ext>
+  </p:extLst>
 </p:presentation>
 </file>
 
@@ -3155,6 +3163,355 @@
 </dgm:styleDef>
 </file>
 
+<file path=ppt/notesMasters/notesMaster1.xml><?xml version="1.0" encoding="utf-8"?>
+<p:notesMaster xmlns:a="http://schemas.openxmlformats.org/drawingml/2006/main" xmlns:r="http://schemas.openxmlformats.org/officeDocument/2006/relationships" xmlns:p="http://schemas.openxmlformats.org/presentationml/2006/main">
+  <p:cSld>
+    <p:bg>
+      <p:bgRef idx="1001">
+        <a:schemeClr val="bg1"/>
+      </p:bgRef>
+    </p:bg>
+    <p:spTree>
+      <p:nvGrpSpPr>
+        <p:cNvPr id="1" name=""/>
+        <p:cNvGrpSpPr/>
+        <p:nvPr/>
+      </p:nvGrpSpPr>
+      <p:grpSpPr>
+        <a:xfrm>
+          <a:off x="0" y="0"/>
+          <a:ext cx="0" cy="0"/>
+          <a:chOff x="0" y="0"/>
+          <a:chExt cx="0" cy="0"/>
+        </a:xfrm>
+      </p:grpSpPr>
+      <p:sp>
+        <p:nvSpPr>
+          <p:cNvPr id="2" name="Header Placeholder 1"/>
+          <p:cNvSpPr>
+            <a:spLocks noGrp="1"/>
+          </p:cNvSpPr>
+          <p:nvPr>
+            <p:ph type="hdr" sz="quarter"/>
+          </p:nvPr>
+        </p:nvSpPr>
+        <p:spPr>
+          <a:xfrm>
+            <a:off x="0" y="0"/>
+            <a:ext cx="2971800" cy="458788"/>
+          </a:xfrm>
+          <a:prstGeom prst="rect">
+            <a:avLst/>
+          </a:prstGeom>
+        </p:spPr>
+        <p:txBody>
+          <a:bodyPr vert="horz" lIns="91440" tIns="45720" rIns="91440" bIns="45720" rtlCol="0"/>
+          <a:lstStyle>
+            <a:lvl1pPr algn="l">
+              <a:defRPr sz="1200"/>
+            </a:lvl1pPr>
+          </a:lstStyle>
+          <a:p>
+            <a:endParaRPr lang="en-US"/>
+          </a:p>
+        </p:txBody>
+      </p:sp>
+      <p:sp>
+        <p:nvSpPr>
+          <p:cNvPr id="3" name="Date Placeholder 2"/>
+          <p:cNvSpPr>
+            <a:spLocks noGrp="1"/>
+          </p:cNvSpPr>
+          <p:nvPr>
+            <p:ph type="dt" idx="1"/>
+          </p:nvPr>
+        </p:nvSpPr>
+        <p:spPr>
+          <a:xfrm>
+            <a:off x="3884613" y="0"/>
+            <a:ext cx="2971800" cy="458788"/>
+          </a:xfrm>
+          <a:prstGeom prst="rect">
+            <a:avLst/>
+          </a:prstGeom>
+        </p:spPr>
+        <p:txBody>
+          <a:bodyPr vert="horz" lIns="91440" tIns="45720" rIns="91440" bIns="45720" rtlCol="0"/>
+          <a:lstStyle>
+            <a:lvl1pPr algn="r">
+              <a:defRPr sz="1200"/>
+            </a:lvl1pPr>
+          </a:lstStyle>
+          <a:p>
+            <a:fld id="{8D8D4160-9A99-4FB1-9448-12163F5AC992}" type="datetimeFigureOut">
+              <a:rPr lang="en-US" smtClean="0"/>
+              <a:t>10/7/2023</a:t>
+            </a:fld>
+            <a:endParaRPr lang="en-US"/>
+          </a:p>
+        </p:txBody>
+      </p:sp>
+      <p:sp>
+        <p:nvSpPr>
+          <p:cNvPr id="4" name="Slide Image Placeholder 3"/>
+          <p:cNvSpPr>
+            <a:spLocks noGrp="1" noRot="1" noChangeAspect="1"/>
+          </p:cNvSpPr>
+          <p:nvPr>
+            <p:ph type="sldImg" idx="2"/>
+          </p:nvPr>
+        </p:nvSpPr>
+        <p:spPr>
+          <a:xfrm>
+            <a:off x="685800" y="1143000"/>
+            <a:ext cx="5486400" cy="3086100"/>
+          </a:xfrm>
+          <a:prstGeom prst="rect">
+            <a:avLst/>
+          </a:prstGeom>
+          <a:noFill/>
+          <a:ln w="12700">
+            <a:solidFill>
+              <a:prstClr val="black"/>
+            </a:solidFill>
+          </a:ln>
+        </p:spPr>
+        <p:txBody>
+          <a:bodyPr vert="horz" lIns="91440" tIns="45720" rIns="91440" bIns="45720" rtlCol="0" anchor="ctr"/>
+          <a:lstStyle/>
+          <a:p>
+            <a:endParaRPr lang="en-US"/>
+          </a:p>
+        </p:txBody>
+      </p:sp>
+      <p:sp>
+        <p:nvSpPr>
+          <p:cNvPr id="5" name="Notes Placeholder 4"/>
+          <p:cNvSpPr>
+            <a:spLocks noGrp="1"/>
+          </p:cNvSpPr>
+          <p:nvPr>
+            <p:ph type="body" sz="quarter" idx="3"/>
+          </p:nvPr>
+        </p:nvSpPr>
+        <p:spPr>
+          <a:xfrm>
+            <a:off x="685800" y="4400550"/>
+            <a:ext cx="5486400" cy="3600450"/>
+          </a:xfrm>
+          <a:prstGeom prst="rect">
+            <a:avLst/>
+          </a:prstGeom>
+        </p:spPr>
+        <p:txBody>
+          <a:bodyPr vert="horz" lIns="91440" tIns="45720" rIns="91440" bIns="45720" rtlCol="0"/>
+          <a:lstStyle/>
+          <a:p>
+            <a:pPr lvl="0"/>
+            <a:r>
+              <a:rPr lang="en-US"/>
+              <a:t>Click to edit Master text styles</a:t>
+            </a:r>
+          </a:p>
+          <a:p>
+            <a:pPr lvl="1"/>
+            <a:r>
+              <a:rPr lang="en-US"/>
+              <a:t>Second level</a:t>
+            </a:r>
+          </a:p>
+          <a:p>
+            <a:pPr lvl="2"/>
+            <a:r>
+              <a:rPr lang="en-US"/>
+              <a:t>Third level</a:t>
+            </a:r>
+          </a:p>
+          <a:p>
+            <a:pPr lvl="3"/>
+            <a:r>
+              <a:rPr lang="en-US"/>
+              <a:t>Fourth level</a:t>
+            </a:r>
+          </a:p>
+          <a:p>
+            <a:pPr lvl="4"/>
+            <a:r>
+              <a:rPr lang="en-US"/>
+              <a:t>Fifth level</a:t>
+            </a:r>
+          </a:p>
+        </p:txBody>
+      </p:sp>
+      <p:sp>
+        <p:nvSpPr>
+          <p:cNvPr id="6" name="Footer Placeholder 5"/>
+          <p:cNvSpPr>
+            <a:spLocks noGrp="1"/>
+          </p:cNvSpPr>
+          <p:nvPr>
+            <p:ph type="ftr" sz="quarter" idx="4"/>
+          </p:nvPr>
+        </p:nvSpPr>
+        <p:spPr>
+          <a:xfrm>
+            <a:off x="0" y="8685213"/>
+            <a:ext cx="2971800" cy="458787"/>
+          </a:xfrm>
+          <a:prstGeom prst="rect">
+            <a:avLst/>
+          </a:prstGeom>
+        </p:spPr>
+        <p:txBody>
+          <a:bodyPr vert="horz" lIns="91440" tIns="45720" rIns="91440" bIns="45720" rtlCol="0" anchor="b"/>
+          <a:lstStyle>
+            <a:lvl1pPr algn="l">
+              <a:defRPr sz="1200"/>
+            </a:lvl1pPr>
+          </a:lstStyle>
+          <a:p>
+            <a:endParaRPr lang="en-US"/>
+          </a:p>
+        </p:txBody>
+      </p:sp>
+      <p:sp>
+        <p:nvSpPr>
+          <p:cNvPr id="7" name="Slide Number Placeholder 6"/>
+          <p:cNvSpPr>
+            <a:spLocks noGrp="1"/>
+          </p:cNvSpPr>
+          <p:nvPr>
+            <p:ph type="sldNum" sz="quarter" idx="5"/>
+          </p:nvPr>
+        </p:nvSpPr>
+        <p:spPr>
+          <a:xfrm>
+            <a:off x="3884613" y="8685213"/>
+            <a:ext cx="2971800" cy="458787"/>
+          </a:xfrm>
+          <a:prstGeom prst="rect">
+            <a:avLst/>
+          </a:prstGeom>
+        </p:spPr>
+        <p:txBody>
+          <a:bodyPr vert="horz" lIns="91440" tIns="45720" rIns="91440" bIns="45720" rtlCol="0" anchor="b"/>
+          <a:lstStyle>
+            <a:lvl1pPr algn="r">
+              <a:defRPr sz="1200"/>
+            </a:lvl1pPr>
+          </a:lstStyle>
+          <a:p>
+            <a:fld id="{1C0BFD54-532E-4FA4-84D4-142C9898672E}" type="slidenum">
+              <a:rPr lang="en-US" smtClean="0"/>
+              <a:t>‹#›</a:t>
+            </a:fld>
+            <a:endParaRPr lang="en-US"/>
+          </a:p>
+        </p:txBody>
+      </p:sp>
+    </p:spTree>
+    <p:extLst>
+      <p:ext uri="{BB962C8B-B14F-4D97-AF65-F5344CB8AC3E}">
+        <p14:creationId xmlns:p14="http://schemas.microsoft.com/office/powerpoint/2010/main" val="4050514655"/>
+      </p:ext>
+    </p:extLst>
+  </p:cSld>
+  <p:clrMap bg1="lt1" tx1="dk1" bg2="lt2" tx2="dk2" accent1="accent1" accent2="accent2" accent3="accent3" accent4="accent4" accent5="accent5" accent6="accent6" hlink="hlink" folHlink="folHlink"/>
+  <p:notesStyle>
+    <a:lvl1pPr marL="0" algn="l" defTabSz="914400" rtl="0" eaLnBrk="1" latinLnBrk="0" hangingPunct="1">
+      <a:defRPr sz="1200" kern="1200">
+        <a:solidFill>
+          <a:schemeClr val="tx1"/>
+        </a:solidFill>
+        <a:latin typeface="+mn-lt"/>
+        <a:ea typeface="+mn-ea"/>
+        <a:cs typeface="+mn-cs"/>
+      </a:defRPr>
+    </a:lvl1pPr>
+    <a:lvl2pPr marL="457200" algn="l" defTabSz="914400" rtl="0" eaLnBrk="1" latinLnBrk="0" hangingPunct="1">
+      <a:defRPr sz="1200" kern="1200">
+        <a:solidFill>
+          <a:schemeClr val="tx1"/>
+        </a:solidFill>
+        <a:latin typeface="+mn-lt"/>
+        <a:ea typeface="+mn-ea"/>
+        <a:cs typeface="+mn-cs"/>
+      </a:defRPr>
+    </a:lvl2pPr>
+    <a:lvl3pPr marL="914400" algn="l" defTabSz="914400" rtl="0" eaLnBrk="1" latinLnBrk="0" hangingPunct="1">
+      <a:defRPr sz="1200" kern="1200">
+        <a:solidFill>
+          <a:schemeClr val="tx1"/>
+        </a:solidFill>
+        <a:latin typeface="+mn-lt"/>
+        <a:ea typeface="+mn-ea"/>
+        <a:cs typeface="+mn-cs"/>
+      </a:defRPr>
+    </a:lvl3pPr>
+    <a:lvl4pPr marL="1371600" algn="l" defTabSz="914400" rtl="0" eaLnBrk="1" latinLnBrk="0" hangingPunct="1">
+      <a:defRPr sz="1200" kern="1200">
+        <a:solidFill>
+          <a:schemeClr val="tx1"/>
+        </a:solidFill>
+        <a:latin typeface="+mn-lt"/>
+        <a:ea typeface="+mn-ea"/>
+        <a:cs typeface="+mn-cs"/>
+      </a:defRPr>
+    </a:lvl4pPr>
+    <a:lvl5pPr marL="1828800" algn="l" defTabSz="914400" rtl="0" eaLnBrk="1" latinLnBrk="0" hangingPunct="1">
+      <a:defRPr sz="1200" kern="1200">
+        <a:solidFill>
+          <a:schemeClr val="tx1"/>
+        </a:solidFill>
+        <a:latin typeface="+mn-lt"/>
+        <a:ea typeface="+mn-ea"/>
+        <a:cs typeface="+mn-cs"/>
+      </a:defRPr>
+    </a:lvl5pPr>
+    <a:lvl6pPr marL="2286000" algn="l" defTabSz="914400" rtl="0" eaLnBrk="1" latinLnBrk="0" hangingPunct="1">
+      <a:defRPr sz="1200" kern="1200">
+        <a:solidFill>
+          <a:schemeClr val="tx1"/>
+        </a:solidFill>
+        <a:latin typeface="+mn-lt"/>
+        <a:ea typeface="+mn-ea"/>
+        <a:cs typeface="+mn-cs"/>
+      </a:defRPr>
+    </a:lvl6pPr>
+    <a:lvl7pPr marL="2743200" algn="l" defTabSz="914400" rtl="0" eaLnBrk="1" latinLnBrk="0" hangingPunct="1">
+      <a:defRPr sz="1200" kern="1200">
+        <a:solidFill>
+          <a:schemeClr val="tx1"/>
+        </a:solidFill>
+        <a:latin typeface="+mn-lt"/>
+        <a:ea typeface="+mn-ea"/>
+        <a:cs typeface="+mn-cs"/>
+      </a:defRPr>
+    </a:lvl7pPr>
+    <a:lvl8pPr marL="3200400" algn="l" defTabSz="914400" rtl="0" eaLnBrk="1" latinLnBrk="0" hangingPunct="1">
+      <a:defRPr sz="1200" kern="1200">
+        <a:solidFill>
+          <a:schemeClr val="tx1"/>
+        </a:solidFill>
+        <a:latin typeface="+mn-lt"/>
+        <a:ea typeface="+mn-ea"/>
+        <a:cs typeface="+mn-cs"/>
+      </a:defRPr>
+    </a:lvl8pPr>
+    <a:lvl9pPr marL="3657600" algn="l" defTabSz="914400" rtl="0" eaLnBrk="1" latinLnBrk="0" hangingPunct="1">
+      <a:defRPr sz="1200" kern="1200">
+        <a:solidFill>
+          <a:schemeClr val="tx1"/>
+        </a:solidFill>
+        <a:latin typeface="+mn-lt"/>
+        <a:ea typeface="+mn-ea"/>
+        <a:cs typeface="+mn-cs"/>
+      </a:defRPr>
+    </a:lvl9pPr>
+  </p:notesStyle>
+</p:notesMaster>
+</file>
+
 <file path=ppt/slideLayouts/slideLayout1.xml><?xml version="1.0" encoding="utf-8"?>
 <p:sldLayout xmlns:a="http://schemas.openxmlformats.org/drawingml/2006/main" xmlns:r="http://schemas.openxmlformats.org/officeDocument/2006/relationships" xmlns:p="http://schemas.openxmlformats.org/presentationml/2006/main" type="title" preserve="1">
   <p:cSld name="Title Slide">
@@ -3313,7 +3670,7 @@
           <a:bodyPr/>
           <a:lstStyle/>
           <a:p>
-            <a:fld id="{64F0E216-BA48-4F04-AC4F-645AA0DD6AC6}" type="datetimeFigureOut">
+            <a:fld id="{C16970EA-0526-452E-8D4A-3E334CC4AB1D}" type="datetime1">
               <a:rPr lang="en-US" smtClean="0"/>
               <a:t>10/7/2023</a:t>
             </a:fld>
@@ -4361,7 +4718,7 @@
           <a:bodyPr/>
           <a:lstStyle/>
           <a:p>
-            <a:fld id="{64F0E216-BA48-4F04-AC4F-645AA0DD6AC6}" type="datetimeFigureOut">
+            <a:fld id="{219D28BD-D2E1-4BF4-BDC2-77CD2AD0C10A}" type="datetime1">
               <a:rPr lang="en-US" smtClean="0"/>
               <a:t>10/7/2023</a:t>
             </a:fld>
@@ -4597,7 +4954,7 @@
           <a:bodyPr/>
           <a:lstStyle/>
           <a:p>
-            <a:fld id="{64F0E216-BA48-4F04-AC4F-645AA0DD6AC6}" type="datetimeFigureOut">
+            <a:fld id="{A9C34CCF-4250-4599-888E-F462F59651BD}" type="datetime1">
               <a:rPr lang="en-US" smtClean="0"/>
               <a:t>10/7/2023</a:t>
             </a:fld>
@@ -4820,7 +5177,7 @@
           <a:bodyPr/>
           <a:lstStyle/>
           <a:p>
-            <a:fld id="{64F0E216-BA48-4F04-AC4F-645AA0DD6AC6}" type="datetimeFigureOut">
+            <a:fld id="{71003096-1E3E-4F0C-BB57-342303D97B7E}" type="datetime1">
               <a:rPr lang="en-US" smtClean="0"/>
               <a:t>10/7/2023</a:t>
             </a:fld>
@@ -5122,7 +5479,7 @@
           <a:bodyPr/>
           <a:lstStyle/>
           <a:p>
-            <a:fld id="{64F0E216-BA48-4F04-AC4F-645AA0DD6AC6}" type="datetimeFigureOut">
+            <a:fld id="{8195741B-D483-4DE5-A2B2-B6F9A55C098F}" type="datetime1">
               <a:rPr lang="en-US" smtClean="0"/>
               <a:t>10/7/2023</a:t>
             </a:fld>
@@ -6586,7 +6943,7 @@
           <a:bodyPr/>
           <a:lstStyle/>
           <a:p>
-            <a:fld id="{64F0E216-BA48-4F04-AC4F-645AA0DD6AC6}" type="datetimeFigureOut">
+            <a:fld id="{4BB05BB7-5DF4-4B1E-B05D-7CFADA204347}" type="datetime1">
               <a:rPr lang="en-US" smtClean="0"/>
               <a:t>10/7/2023</a:t>
             </a:fld>
@@ -7053,7 +7410,7 @@
           <a:bodyPr/>
           <a:lstStyle/>
           <a:p>
-            <a:fld id="{64F0E216-BA48-4F04-AC4F-645AA0DD6AC6}" type="datetimeFigureOut">
+            <a:fld id="{D845F68F-905B-4E9D-B321-130B6DEF91E5}" type="datetime1">
               <a:rPr lang="en-US" smtClean="0"/>
               <a:t>10/7/2023</a:t>
             </a:fld>
@@ -7228,7 +7585,7 @@
           <a:bodyPr/>
           <a:lstStyle/>
           <a:p>
-            <a:fld id="{64F0E216-BA48-4F04-AC4F-645AA0DD6AC6}" type="datetimeFigureOut">
+            <a:fld id="{7FD3176A-1E19-4852-98F6-623052FA7D7E}" type="datetime1">
               <a:rPr lang="en-US" smtClean="0"/>
               <a:t>10/7/2023</a:t>
             </a:fld>
@@ -7365,7 +7722,7 @@
           <a:bodyPr/>
           <a:lstStyle/>
           <a:p>
-            <a:fld id="{64F0E216-BA48-4F04-AC4F-645AA0DD6AC6}" type="datetimeFigureOut">
+            <a:fld id="{9652EB06-0A9F-426C-8C8B-342C5F3953B1}" type="datetime1">
               <a:rPr lang="en-US" smtClean="0"/>
               <a:t>10/7/2023</a:t>
             </a:fld>
@@ -7715,7 +8072,7 @@
           <a:bodyPr/>
           <a:lstStyle/>
           <a:p>
-            <a:fld id="{64F0E216-BA48-4F04-AC4F-645AA0DD6AC6}" type="datetimeFigureOut">
+            <a:fld id="{081E825E-A1A7-44E8-881B-D665A2FBFF9E}" type="datetime1">
               <a:rPr lang="en-US" smtClean="0"/>
               <a:t>10/7/2023</a:t>
             </a:fld>
@@ -8036,7 +8393,7 @@
           <a:bodyPr/>
           <a:lstStyle/>
           <a:p>
-            <a:fld id="{64F0E216-BA48-4F04-AC4F-645AA0DD6AC6}" type="datetimeFigureOut">
+            <a:fld id="{71597319-8316-42E4-BC99-E40101CCF5E3}" type="datetime1">
               <a:rPr lang="en-US" smtClean="0"/>
               <a:t>10/7/2023</a:t>
             </a:fld>
@@ -8291,9 +8648,8 @@
             </a:lvl1pPr>
           </a:lstStyle>
           <a:p>
-            <a:fld id="{64F0E216-BA48-4F04-AC4F-645AA0DD6AC6}" type="datetimeFigureOut">
+            <a:fld id="{EC7C2F1D-CA67-45B4-B145-430E713867CD}" type="datetime1">
               <a:rPr lang="en-US" smtClean="0"/>
-              <a:pPr/>
               <a:t>10/7/2023</a:t>
             </a:fld>
             <a:endParaRPr lang="en-US" dirty="0"/>
@@ -8412,6 +8768,7 @@
     <p:sldLayoutId id="2147483710" r:id="rId10"/>
     <p:sldLayoutId id="2147483711" r:id="rId11"/>
   </p:sldLayoutIdLst>
+  <p:hf hdr="0" ftr="0" dt="0"/>
   <p:txStyles>
     <p:titleStyle>
       <a:lvl1pPr algn="l" defTabSz="914400" rtl="0" eaLnBrk="1" latinLnBrk="0" hangingPunct="1">
@@ -9002,6 +9359,35 @@
           </a:fontRef>
         </p:style>
       </p:cxnSp>
+      <p:sp>
+        <p:nvSpPr>
+          <p:cNvPr id="5" name="Slide Number Placeholder 4">
+            <a:extLst>
+              <a:ext uri="{FF2B5EF4-FFF2-40B4-BE49-F238E27FC236}">
+                <a16:creationId xmlns:a16="http://schemas.microsoft.com/office/drawing/2014/main" id="{DEC96CE9-DA8B-C960-D741-C7AA785CB946}"/>
+              </a:ext>
+            </a:extLst>
+          </p:cNvPr>
+          <p:cNvSpPr>
+            <a:spLocks noGrp="1"/>
+          </p:cNvSpPr>
+          <p:nvPr>
+            <p:ph type="sldNum" sz="quarter" idx="12"/>
+          </p:nvPr>
+        </p:nvSpPr>
+        <p:spPr/>
+        <p:txBody>
+          <a:bodyPr/>
+          <a:lstStyle/>
+          <a:p>
+            <a:fld id="{D39607A7-8386-47DB-8578-DDEDD194E5D4}" type="slidenum">
+              <a:rPr lang="en-US" smtClean="0"/>
+              <a:t>1</a:t>
+            </a:fld>
+            <a:endParaRPr lang="en-US" dirty="0"/>
+          </a:p>
+        </p:txBody>
+      </p:sp>
     </p:spTree>
     <p:extLst>
       <p:ext uri="{BB962C8B-B14F-4D97-AF65-F5344CB8AC3E}">
@@ -10190,6 +10576,180 @@
           </a:prstGeom>
         </p:spPr>
       </p:pic>
+      <p:sp>
+        <p:nvSpPr>
+          <p:cNvPr id="3" name="Slide Number Placeholder 2">
+            <a:extLst>
+              <a:ext uri="{FF2B5EF4-FFF2-40B4-BE49-F238E27FC236}">
+                <a16:creationId xmlns:a16="http://schemas.microsoft.com/office/drawing/2014/main" id="{36884E99-F13A-EC83-E583-619D4CEA289C}"/>
+              </a:ext>
+            </a:extLst>
+          </p:cNvPr>
+          <p:cNvSpPr>
+            <a:spLocks noGrp="1"/>
+          </p:cNvSpPr>
+          <p:nvPr>
+            <p:ph type="sldNum" sz="quarter" idx="12"/>
+          </p:nvPr>
+        </p:nvSpPr>
+        <p:spPr/>
+        <p:txBody>
+          <a:bodyPr/>
+          <a:lstStyle/>
+          <a:p>
+            <a:fld id="{D39607A7-8386-47DB-8578-DDEDD194E5D4}" type="slidenum">
+              <a:rPr lang="en-US" smtClean="0"/>
+              <a:t>10</a:t>
+            </a:fld>
+            <a:endParaRPr lang="en-US"/>
+          </a:p>
+        </p:txBody>
+      </p:sp>
+      <p:sp>
+        <p:nvSpPr>
+          <p:cNvPr id="4" name="TextBox 3">
+            <a:extLst>
+              <a:ext uri="{FF2B5EF4-FFF2-40B4-BE49-F238E27FC236}">
+                <a16:creationId xmlns:a16="http://schemas.microsoft.com/office/drawing/2014/main" id="{2FF21A41-6F57-F545-781F-69213E6A4695}"/>
+              </a:ext>
+            </a:extLst>
+          </p:cNvPr>
+          <p:cNvSpPr txBox="1"/>
+          <p:nvPr/>
+        </p:nvSpPr>
+        <p:spPr>
+          <a:xfrm>
+            <a:off x="480035" y="6140389"/>
+            <a:ext cx="3195853" cy="430887"/>
+          </a:xfrm>
+          <a:prstGeom prst="rect">
+            <a:avLst/>
+          </a:prstGeom>
+          <a:noFill/>
+        </p:spPr>
+        <p:txBody>
+          <a:bodyPr wrap="square" rtlCol="0">
+            <a:spAutoFit/>
+          </a:bodyPr>
+          <a:lstStyle/>
+          <a:p>
+            <a:r>
+              <a:rPr lang="en-US" sz="1100" dirty="0"/>
+              <a:t>Fig 8 : mrm8488 _ </a:t>
+            </a:r>
+            <a:r>
+              <a:rPr lang="en-US" sz="1100" dirty="0" err="1"/>
+              <a:t>bert</a:t>
+            </a:r>
+            <a:r>
+              <a:rPr lang="en-US" sz="1100" dirty="0"/>
+              <a:t>-tiny-finetuned-</a:t>
+            </a:r>
+            <a:r>
+              <a:rPr lang="en-US" sz="1100" dirty="0" err="1"/>
+              <a:t>sms</a:t>
+            </a:r>
+            <a:r>
+              <a:rPr lang="en-US" sz="1100" dirty="0"/>
+              <a:t>-spam-detection</a:t>
+            </a:r>
+          </a:p>
+        </p:txBody>
+      </p:sp>
+      <p:sp>
+        <p:nvSpPr>
+          <p:cNvPr id="6" name="TextBox 5">
+            <a:extLst>
+              <a:ext uri="{FF2B5EF4-FFF2-40B4-BE49-F238E27FC236}">
+                <a16:creationId xmlns:a16="http://schemas.microsoft.com/office/drawing/2014/main" id="{E72E962F-4018-9D2E-A7E0-B162297C1E46}"/>
+              </a:ext>
+            </a:extLst>
+          </p:cNvPr>
+          <p:cNvSpPr txBox="1"/>
+          <p:nvPr/>
+        </p:nvSpPr>
+        <p:spPr>
+          <a:xfrm>
+            <a:off x="4333975" y="6172393"/>
+            <a:ext cx="3439692" cy="430887"/>
+          </a:xfrm>
+          <a:prstGeom prst="rect">
+            <a:avLst/>
+          </a:prstGeom>
+          <a:noFill/>
+        </p:spPr>
+        <p:txBody>
+          <a:bodyPr wrap="square" rtlCol="0">
+            <a:spAutoFit/>
+          </a:bodyPr>
+          <a:lstStyle/>
+          <a:p>
+            <a:r>
+              <a:rPr lang="en-US" sz="1100" dirty="0"/>
+              <a:t>Fig 9 : mrm8488_bert-tiny-finetuned-enron-spam-detection</a:t>
+            </a:r>
+          </a:p>
+        </p:txBody>
+      </p:sp>
+      <p:sp>
+        <p:nvSpPr>
+          <p:cNvPr id="8" name="TextBox 7">
+            <a:extLst>
+              <a:ext uri="{FF2B5EF4-FFF2-40B4-BE49-F238E27FC236}">
+                <a16:creationId xmlns:a16="http://schemas.microsoft.com/office/drawing/2014/main" id="{5F588145-976C-B7AC-EF09-6DA893DA3BAA}"/>
+              </a:ext>
+            </a:extLst>
+          </p:cNvPr>
+          <p:cNvSpPr txBox="1"/>
+          <p:nvPr/>
+        </p:nvSpPr>
+        <p:spPr>
+          <a:xfrm>
+            <a:off x="8126612" y="6131997"/>
+            <a:ext cx="3524400" cy="430887"/>
+          </a:xfrm>
+          <a:prstGeom prst="rect">
+            <a:avLst/>
+          </a:prstGeom>
+          <a:noFill/>
+        </p:spPr>
+        <p:txBody>
+          <a:bodyPr wrap="square" rtlCol="0">
+            <a:spAutoFit/>
+          </a:bodyPr>
+          <a:lstStyle/>
+          <a:p>
+            <a:r>
+              <a:rPr lang="en-US" sz="1100" dirty="0"/>
+              <a:t>Fig 10 : </a:t>
+            </a:r>
+            <a:r>
+              <a:rPr lang="en-US" sz="1100" dirty="0" err="1"/>
+              <a:t>mariagrandury</a:t>
+            </a:r>
+            <a:r>
+              <a:rPr lang="en-US" sz="1100" dirty="0"/>
+              <a:t>/</a:t>
+            </a:r>
+            <a:r>
+              <a:rPr lang="en-US" sz="1100" dirty="0" err="1"/>
+              <a:t>roberta</a:t>
+            </a:r>
+            <a:r>
+              <a:rPr lang="en-US" sz="1100" dirty="0"/>
+              <a:t>-base-finetuned-</a:t>
+            </a:r>
+            <a:r>
+              <a:rPr lang="en-US" sz="1100" dirty="0" err="1"/>
+              <a:t>sms</a:t>
+            </a:r>
+            <a:r>
+              <a:rPr lang="en-US" sz="1100" dirty="0"/>
+              <a:t>-spam-detection</a:t>
+            </a:r>
+          </a:p>
+        </p:txBody>
+      </p:sp>
     </p:spTree>
     <p:extLst>
       <p:ext uri="{BB962C8B-B14F-4D97-AF65-F5344CB8AC3E}">
@@ -10270,7 +10830,7 @@
             <p:ph idx="1"/>
             <p:extLst>
               <p:ext uri="{D42A27DB-BD31-4B8C-83A1-F6EECF244321}">
-                <p14:modId xmlns:p14="http://schemas.microsoft.com/office/powerpoint/2010/main" val="454090321"/>
+                <p14:modId xmlns:p14="http://schemas.microsoft.com/office/powerpoint/2010/main" val="1818613814"/>
               </p:ext>
             </p:extLst>
           </p:nvPr>
@@ -12279,6 +12839,70 @@
           </a:graphicData>
         </a:graphic>
       </p:graphicFrame>
+      <p:sp>
+        <p:nvSpPr>
+          <p:cNvPr id="3" name="Slide Number Placeholder 2">
+            <a:extLst>
+              <a:ext uri="{FF2B5EF4-FFF2-40B4-BE49-F238E27FC236}">
+                <a16:creationId xmlns:a16="http://schemas.microsoft.com/office/drawing/2014/main" id="{9823EA55-5A96-E4D0-68B5-4ADC2466428C}"/>
+              </a:ext>
+            </a:extLst>
+          </p:cNvPr>
+          <p:cNvSpPr>
+            <a:spLocks noGrp="1"/>
+          </p:cNvSpPr>
+          <p:nvPr>
+            <p:ph type="sldNum" sz="quarter" idx="12"/>
+          </p:nvPr>
+        </p:nvSpPr>
+        <p:spPr/>
+        <p:txBody>
+          <a:bodyPr/>
+          <a:lstStyle/>
+          <a:p>
+            <a:fld id="{D39607A7-8386-47DB-8578-DDEDD194E5D4}" type="slidenum">
+              <a:rPr lang="en-US" smtClean="0"/>
+              <a:t>11</a:t>
+            </a:fld>
+            <a:endParaRPr lang="en-US"/>
+          </a:p>
+        </p:txBody>
+      </p:sp>
+      <p:sp>
+        <p:nvSpPr>
+          <p:cNvPr id="5" name="TextBox 4">
+            <a:extLst>
+              <a:ext uri="{FF2B5EF4-FFF2-40B4-BE49-F238E27FC236}">
+                <a16:creationId xmlns:a16="http://schemas.microsoft.com/office/drawing/2014/main" id="{796BA919-A933-67B2-F73D-81DCA32EE52F}"/>
+              </a:ext>
+            </a:extLst>
+          </p:cNvPr>
+          <p:cNvSpPr txBox="1"/>
+          <p:nvPr/>
+        </p:nvSpPr>
+        <p:spPr>
+          <a:xfrm>
+            <a:off x="307232" y="6401999"/>
+            <a:ext cx="3041474" cy="369332"/>
+          </a:xfrm>
+          <a:prstGeom prst="rect">
+            <a:avLst/>
+          </a:prstGeom>
+          <a:noFill/>
+        </p:spPr>
+        <p:txBody>
+          <a:bodyPr wrap="none" rtlCol="0">
+            <a:spAutoFit/>
+          </a:bodyPr>
+          <a:lstStyle/>
+          <a:p>
+            <a:r>
+              <a:rPr lang="en-US" dirty="0"/>
+              <a:t>Fig 11 : Timeline Gantt chart</a:t>
+            </a:r>
+          </a:p>
+        </p:txBody>
+      </p:sp>
     </p:spTree>
     <p:extLst>
       <p:ext uri="{BB962C8B-B14F-4D97-AF65-F5344CB8AC3E}">
@@ -13357,6 +13981,35 @@
           </a:fontRef>
         </p:style>
       </p:cxnSp>
+      <p:sp>
+        <p:nvSpPr>
+          <p:cNvPr id="3" name="Slide Number Placeholder 2">
+            <a:extLst>
+              <a:ext uri="{FF2B5EF4-FFF2-40B4-BE49-F238E27FC236}">
+                <a16:creationId xmlns:a16="http://schemas.microsoft.com/office/drawing/2014/main" id="{E466BA81-3C49-054D-5B20-989AF474DCDE}"/>
+              </a:ext>
+            </a:extLst>
+          </p:cNvPr>
+          <p:cNvSpPr>
+            <a:spLocks noGrp="1"/>
+          </p:cNvSpPr>
+          <p:nvPr>
+            <p:ph type="sldNum" sz="quarter" idx="12"/>
+          </p:nvPr>
+        </p:nvSpPr>
+        <p:spPr/>
+        <p:txBody>
+          <a:bodyPr/>
+          <a:lstStyle/>
+          <a:p>
+            <a:fld id="{D39607A7-8386-47DB-8578-DDEDD194E5D4}" type="slidenum">
+              <a:rPr lang="en-US" smtClean="0"/>
+              <a:t>12</a:t>
+            </a:fld>
+            <a:endParaRPr lang="en-US"/>
+          </a:p>
+        </p:txBody>
+      </p:sp>
     </p:spTree>
     <p:extLst>
       <p:ext uri="{BB962C8B-B14F-4D97-AF65-F5344CB8AC3E}">
@@ -14365,8 +15018,8 @@
         </p:nvSpPr>
         <p:spPr>
           <a:xfrm>
-            <a:off x="1079510" y="531814"/>
-            <a:ext cx="4457690" cy="1720850"/>
+            <a:off x="540988" y="213486"/>
+            <a:ext cx="4015443" cy="1619450"/>
           </a:xfrm>
         </p:spPr>
         <p:txBody>
@@ -14377,8 +15030,8 @@
           <a:p>
             <a:pPr algn="ctr"/>
             <a:r>
-              <a:rPr lang="en-US" sz="2800" cap="all" spc="400"/>
-              <a:t>Research Question and Objective</a:t>
+              <a:rPr lang="en-US" sz="2800" cap="all" spc="400" dirty="0"/>
+              <a:t>Research Question</a:t>
             </a:r>
           </a:p>
         </p:txBody>
@@ -14437,10 +15090,13 @@
       </p:cxnSp>
       <p:pic>
         <p:nvPicPr>
-          <p:cNvPr id="4" name="Content Placeholder 3" descr="A blue circle with white text">
+          <p:cNvPr id="4" name="Content Placeholder 3" descr="According to a report by the Radicati Group, in 2021, spam accounted for approximately 45.56% of all email traffic globally">
             <a:extLst>
               <a:ext uri="{FF2B5EF4-FFF2-40B4-BE49-F238E27FC236}">
                 <a16:creationId xmlns:a16="http://schemas.microsoft.com/office/drawing/2014/main" id="{094012D5-B002-A994-64B3-76C873B65F0B}"/>
+              </a:ext>
+              <a:ext uri="{C183D7F6-B498-43B3-948B-1728B52AA6E4}">
+                <adec:decorative xmlns:adec="http://schemas.microsoft.com/office/drawing/2017/decorative" val="0"/>
               </a:ext>
             </a:extLst>
           </p:cNvPr>
@@ -14465,7 +15121,7 @@
         </p:blipFill>
         <p:spPr>
           <a:xfrm>
-            <a:off x="689691" y="2843214"/>
+            <a:off x="497868" y="1832936"/>
             <a:ext cx="5124896" cy="3472117"/>
           </a:xfrm>
           <a:prstGeom prst="rect">
@@ -14501,7 +15157,7 @@
         </p:blipFill>
         <p:spPr>
           <a:xfrm>
-            <a:off x="6376374" y="2841329"/>
+            <a:off x="6366000" y="1832936"/>
             <a:ext cx="5127676" cy="3474000"/>
           </a:xfrm>
           <a:prstGeom prst="rect">
@@ -14509,6 +15165,133 @@
           </a:prstGeom>
         </p:spPr>
       </p:pic>
+      <p:sp>
+        <p:nvSpPr>
+          <p:cNvPr id="3" name="Slide Number Placeholder 2">
+            <a:extLst>
+              <a:ext uri="{FF2B5EF4-FFF2-40B4-BE49-F238E27FC236}">
+                <a16:creationId xmlns:a16="http://schemas.microsoft.com/office/drawing/2014/main" id="{BDF1D210-A5C3-D7A8-65E7-DD790D4E82B3}"/>
+              </a:ext>
+            </a:extLst>
+          </p:cNvPr>
+          <p:cNvSpPr>
+            <a:spLocks noGrp="1"/>
+          </p:cNvSpPr>
+          <p:nvPr>
+            <p:ph type="sldNum" sz="quarter" idx="12"/>
+          </p:nvPr>
+        </p:nvSpPr>
+        <p:spPr/>
+        <p:txBody>
+          <a:bodyPr/>
+          <a:lstStyle/>
+          <a:p>
+            <a:fld id="{D39607A7-8386-47DB-8578-DDEDD194E5D4}" type="slidenum">
+              <a:rPr lang="en-US" smtClean="0"/>
+              <a:t>2</a:t>
+            </a:fld>
+            <a:endParaRPr lang="en-US"/>
+          </a:p>
+        </p:txBody>
+      </p:sp>
+      <p:sp>
+        <p:nvSpPr>
+          <p:cNvPr id="6" name="TextBox 5">
+            <a:extLst>
+              <a:ext uri="{FF2B5EF4-FFF2-40B4-BE49-F238E27FC236}">
+                <a16:creationId xmlns:a16="http://schemas.microsoft.com/office/drawing/2014/main" id="{E229E325-6D70-0A4B-FB87-B27D6EC144DA}"/>
+              </a:ext>
+            </a:extLst>
+          </p:cNvPr>
+          <p:cNvSpPr txBox="1"/>
+          <p:nvPr/>
+        </p:nvSpPr>
+        <p:spPr>
+          <a:xfrm>
+            <a:off x="450143" y="5478669"/>
+            <a:ext cx="5220346" cy="923330"/>
+          </a:xfrm>
+          <a:prstGeom prst="rect">
+            <a:avLst/>
+          </a:prstGeom>
+          <a:noFill/>
+        </p:spPr>
+        <p:txBody>
+          <a:bodyPr wrap="square" rtlCol="0">
+            <a:spAutoFit/>
+          </a:bodyPr>
+          <a:lstStyle/>
+          <a:p>
+            <a:r>
+              <a:rPr lang="en-US" kern="0" dirty="0">
+                <a:latin typeface="Times New Roman" panose="02020603050405020304" pitchFamily="18" charset="0"/>
+                <a:ea typeface="Times New Roman" panose="02020603050405020304" pitchFamily="18" charset="0"/>
+              </a:rPr>
+              <a:t>Fig 1 : </a:t>
+            </a:r>
+            <a:r>
+              <a:rPr lang="en-US" sz="1800" kern="0" dirty="0">
+                <a:effectLst/>
+                <a:latin typeface="Times New Roman" panose="02020603050405020304" pitchFamily="18" charset="0"/>
+                <a:ea typeface="Times New Roman" panose="02020603050405020304" pitchFamily="18" charset="0"/>
+              </a:rPr>
+              <a:t>According to a report by the </a:t>
+            </a:r>
+            <a:r>
+              <a:rPr lang="en-US" sz="1800" kern="0" dirty="0" err="1">
+                <a:effectLst/>
+                <a:latin typeface="Times New Roman" panose="02020603050405020304" pitchFamily="18" charset="0"/>
+                <a:ea typeface="Times New Roman" panose="02020603050405020304" pitchFamily="18" charset="0"/>
+              </a:rPr>
+              <a:t>Radicati</a:t>
+            </a:r>
+            <a:r>
+              <a:rPr lang="en-US" sz="1800" kern="0" dirty="0">
+                <a:effectLst/>
+                <a:latin typeface="Times New Roman" panose="02020603050405020304" pitchFamily="18" charset="0"/>
+                <a:ea typeface="Times New Roman" panose="02020603050405020304" pitchFamily="18" charset="0"/>
+              </a:rPr>
+              <a:t> Group, in 2021, spam accounted for approximately 45.56% of all email traffic globally</a:t>
+            </a:r>
+            <a:endParaRPr lang="en-US" dirty="0"/>
+          </a:p>
+        </p:txBody>
+      </p:sp>
+      <p:sp>
+        <p:nvSpPr>
+          <p:cNvPr id="7" name="TextBox 6">
+            <a:extLst>
+              <a:ext uri="{FF2B5EF4-FFF2-40B4-BE49-F238E27FC236}">
+                <a16:creationId xmlns:a16="http://schemas.microsoft.com/office/drawing/2014/main" id="{B0C5A440-522F-0F7B-0EB9-EC31B67C6C8D}"/>
+              </a:ext>
+            </a:extLst>
+          </p:cNvPr>
+          <p:cNvSpPr txBox="1"/>
+          <p:nvPr/>
+        </p:nvSpPr>
+        <p:spPr>
+          <a:xfrm>
+            <a:off x="6366000" y="5605272"/>
+            <a:ext cx="5125314" cy="369332"/>
+          </a:xfrm>
+          <a:prstGeom prst="rect">
+            <a:avLst/>
+          </a:prstGeom>
+          <a:noFill/>
+        </p:spPr>
+        <p:txBody>
+          <a:bodyPr wrap="none" rtlCol="0">
+            <a:spAutoFit/>
+          </a:bodyPr>
+          <a:lstStyle/>
+          <a:p>
+            <a:r>
+              <a:rPr lang="en-US" dirty="0"/>
+              <a:t>Fig 2 : Exponential Growth in cost for Businesses </a:t>
+            </a:r>
+          </a:p>
+        </p:txBody>
+      </p:sp>
     </p:spTree>
     <p:extLst>
       <p:ext uri="{BB962C8B-B14F-4D97-AF65-F5344CB8AC3E}">
@@ -14758,6 +15541,35 @@
           </a:graphicData>
         </a:graphic>
       </p:graphicFrame>
+      <p:sp>
+        <p:nvSpPr>
+          <p:cNvPr id="3" name="Slide Number Placeholder 2">
+            <a:extLst>
+              <a:ext uri="{FF2B5EF4-FFF2-40B4-BE49-F238E27FC236}">
+                <a16:creationId xmlns:a16="http://schemas.microsoft.com/office/drawing/2014/main" id="{3948CEA3-20CD-9957-1060-E6DFBD4B8CAF}"/>
+              </a:ext>
+            </a:extLst>
+          </p:cNvPr>
+          <p:cNvSpPr>
+            <a:spLocks noGrp="1"/>
+          </p:cNvSpPr>
+          <p:nvPr>
+            <p:ph type="sldNum" sz="quarter" idx="12"/>
+          </p:nvPr>
+        </p:nvSpPr>
+        <p:spPr/>
+        <p:txBody>
+          <a:bodyPr/>
+          <a:lstStyle/>
+          <a:p>
+            <a:fld id="{D39607A7-8386-47DB-8578-DDEDD194E5D4}" type="slidenum">
+              <a:rPr lang="en-US" smtClean="0"/>
+              <a:t>3</a:t>
+            </a:fld>
+            <a:endParaRPr lang="en-US"/>
+          </a:p>
+        </p:txBody>
+      </p:sp>
     </p:spTree>
     <p:extLst>
       <p:ext uri="{BB962C8B-B14F-4D97-AF65-F5344CB8AC3E}">
@@ -14804,7 +15616,12 @@
             <p:ph type="title"/>
           </p:nvPr>
         </p:nvSpPr>
-        <p:spPr/>
+        <p:spPr>
+          <a:xfrm>
+            <a:off x="594868" y="647074"/>
+            <a:ext cx="10026650" cy="655637"/>
+          </a:xfrm>
+        </p:spPr>
         <p:txBody>
           <a:bodyPr/>
           <a:lstStyle/>
@@ -14844,7 +15661,7 @@
         </p:nvSpPr>
         <p:spPr>
           <a:xfrm>
-            <a:off x="1079500" y="2397190"/>
+            <a:off x="520256" y="2389377"/>
             <a:ext cx="10026650" cy="3978275"/>
           </a:xfrm>
         </p:spPr>
@@ -14962,11 +15779,11 @@
           <a:p>
             <a:pPr lvl="2"/>
             <a:r>
-              <a:rPr lang="en-US" sz="2400" dirty="0" err="1"/>
+              <a:rPr lang="en-US" sz="2400" b="1" dirty="0" err="1"/>
               <a:t>postbot</a:t>
             </a:r>
             <a:r>
-              <a:rPr lang="en-US" sz="2400" dirty="0"/>
+              <a:rPr lang="en-US" sz="2400" b="1" dirty="0"/>
               <a:t>/distilgpt2-emailgen-V2 – </a:t>
             </a:r>
             <a:r>
@@ -15047,7 +15864,7 @@
         </p:blipFill>
         <p:spPr>
           <a:xfrm>
-            <a:off x="8537511" y="133749"/>
+            <a:off x="8638095" y="216045"/>
             <a:ext cx="3333750" cy="2263441"/>
           </a:xfrm>
           <a:prstGeom prst="rect">
@@ -15055,6 +15872,35 @@
           </a:prstGeom>
         </p:spPr>
       </p:pic>
+      <p:sp>
+        <p:nvSpPr>
+          <p:cNvPr id="4" name="Slide Number Placeholder 3">
+            <a:extLst>
+              <a:ext uri="{FF2B5EF4-FFF2-40B4-BE49-F238E27FC236}">
+                <a16:creationId xmlns:a16="http://schemas.microsoft.com/office/drawing/2014/main" id="{651E9287-801D-86AD-5AC2-1DC64FC13ADC}"/>
+              </a:ext>
+            </a:extLst>
+          </p:cNvPr>
+          <p:cNvSpPr>
+            <a:spLocks noGrp="1"/>
+          </p:cNvSpPr>
+          <p:nvPr>
+            <p:ph type="sldNum" sz="quarter" idx="12"/>
+          </p:nvPr>
+        </p:nvSpPr>
+        <p:spPr/>
+        <p:txBody>
+          <a:bodyPr/>
+          <a:lstStyle/>
+          <a:p>
+            <a:fld id="{D39607A7-8386-47DB-8578-DDEDD194E5D4}" type="slidenum">
+              <a:rPr lang="en-US" smtClean="0"/>
+              <a:t>4</a:t>
+            </a:fld>
+            <a:endParaRPr lang="en-US"/>
+          </a:p>
+        </p:txBody>
+      </p:sp>
     </p:spTree>
     <p:extLst>
       <p:ext uri="{BB962C8B-B14F-4D97-AF65-F5344CB8AC3E}">
@@ -15192,7 +16038,7 @@
         </p:blipFill>
         <p:spPr>
           <a:xfrm>
-            <a:off x="1352939" y="1559930"/>
+            <a:off x="1328260" y="1466454"/>
             <a:ext cx="9218646" cy="4935545"/>
           </a:xfrm>
           <a:prstGeom prst="rect">
@@ -15200,6 +16046,70 @@
           </a:prstGeom>
         </p:spPr>
       </p:pic>
+      <p:sp>
+        <p:nvSpPr>
+          <p:cNvPr id="4" name="Slide Number Placeholder 3">
+            <a:extLst>
+              <a:ext uri="{FF2B5EF4-FFF2-40B4-BE49-F238E27FC236}">
+                <a16:creationId xmlns:a16="http://schemas.microsoft.com/office/drawing/2014/main" id="{0964268B-BDB9-C0B8-7ACC-FD7B5468AC2A}"/>
+              </a:ext>
+            </a:extLst>
+          </p:cNvPr>
+          <p:cNvSpPr>
+            <a:spLocks noGrp="1"/>
+          </p:cNvSpPr>
+          <p:nvPr>
+            <p:ph type="sldNum" sz="quarter" idx="12"/>
+          </p:nvPr>
+        </p:nvSpPr>
+        <p:spPr/>
+        <p:txBody>
+          <a:bodyPr/>
+          <a:lstStyle/>
+          <a:p>
+            <a:fld id="{D39607A7-8386-47DB-8578-DDEDD194E5D4}" type="slidenum">
+              <a:rPr lang="en-US" smtClean="0"/>
+              <a:t>5</a:t>
+            </a:fld>
+            <a:endParaRPr lang="en-US"/>
+          </a:p>
+        </p:txBody>
+      </p:sp>
+      <p:sp>
+        <p:nvSpPr>
+          <p:cNvPr id="6" name="TextBox 5">
+            <a:extLst>
+              <a:ext uri="{FF2B5EF4-FFF2-40B4-BE49-F238E27FC236}">
+                <a16:creationId xmlns:a16="http://schemas.microsoft.com/office/drawing/2014/main" id="{3AAEBAC6-B160-FB21-7AF3-BF2D78090FB2}"/>
+              </a:ext>
+            </a:extLst>
+          </p:cNvPr>
+          <p:cNvSpPr txBox="1"/>
+          <p:nvPr/>
+        </p:nvSpPr>
+        <p:spPr>
+          <a:xfrm>
+            <a:off x="1328260" y="6409380"/>
+            <a:ext cx="6354817" cy="369332"/>
+          </a:xfrm>
+          <a:prstGeom prst="rect">
+            <a:avLst/>
+          </a:prstGeom>
+          <a:noFill/>
+        </p:spPr>
+        <p:txBody>
+          <a:bodyPr wrap="none" rtlCol="0">
+            <a:spAutoFit/>
+          </a:bodyPr>
+          <a:lstStyle/>
+          <a:p>
+            <a:r>
+              <a:rPr lang="en-US" dirty="0"/>
+              <a:t>Fig 3 : Generated Spam emails using pre-trained NLP models</a:t>
+            </a:r>
+          </a:p>
+        </p:txBody>
+      </p:sp>
     </p:spTree>
     <p:extLst>
       <p:ext uri="{BB962C8B-B14F-4D97-AF65-F5344CB8AC3E}">
@@ -15720,6 +16630,76 @@
           </a:prstGeom>
         </p:spPr>
       </p:pic>
+      <p:sp>
+        <p:nvSpPr>
+          <p:cNvPr id="4" name="Slide Number Placeholder 3">
+            <a:extLst>
+              <a:ext uri="{FF2B5EF4-FFF2-40B4-BE49-F238E27FC236}">
+                <a16:creationId xmlns:a16="http://schemas.microsoft.com/office/drawing/2014/main" id="{CED94713-777D-AF19-2A6E-DFF47F616170}"/>
+              </a:ext>
+            </a:extLst>
+          </p:cNvPr>
+          <p:cNvSpPr>
+            <a:spLocks noGrp="1"/>
+          </p:cNvSpPr>
+          <p:nvPr>
+            <p:ph type="sldNum" sz="quarter" idx="12"/>
+          </p:nvPr>
+        </p:nvSpPr>
+        <p:spPr/>
+        <p:txBody>
+          <a:bodyPr/>
+          <a:lstStyle/>
+          <a:p>
+            <a:fld id="{D39607A7-8386-47DB-8578-DDEDD194E5D4}" type="slidenum">
+              <a:rPr lang="en-US" smtClean="0"/>
+              <a:t>6</a:t>
+            </a:fld>
+            <a:endParaRPr lang="en-US"/>
+          </a:p>
+        </p:txBody>
+      </p:sp>
+      <p:sp>
+        <p:nvSpPr>
+          <p:cNvPr id="6" name="TextBox 5">
+            <a:extLst>
+              <a:ext uri="{FF2B5EF4-FFF2-40B4-BE49-F238E27FC236}">
+                <a16:creationId xmlns:a16="http://schemas.microsoft.com/office/drawing/2014/main" id="{BEAF7E64-1D92-DE3B-C237-2FCEF570C647}"/>
+              </a:ext>
+            </a:extLst>
+          </p:cNvPr>
+          <p:cNvSpPr txBox="1"/>
+          <p:nvPr/>
+        </p:nvSpPr>
+        <p:spPr>
+          <a:xfrm>
+            <a:off x="5577840" y="5760720"/>
+            <a:ext cx="6212342" cy="646331"/>
+          </a:xfrm>
+          <a:prstGeom prst="rect">
+            <a:avLst/>
+          </a:prstGeom>
+          <a:noFill/>
+        </p:spPr>
+        <p:txBody>
+          <a:bodyPr wrap="none" rtlCol="0">
+            <a:spAutoFit/>
+          </a:bodyPr>
+          <a:lstStyle/>
+          <a:p>
+            <a:r>
+              <a:rPr lang="en-US" dirty="0"/>
+              <a:t>Fig 4 : Performance of classical Machine learning models in </a:t>
+            </a:r>
+          </a:p>
+          <a:p>
+            <a:r>
+              <a:rPr lang="en-US" dirty="0"/>
+              <a:t>Spam Email Classification</a:t>
+            </a:r>
+          </a:p>
+        </p:txBody>
+      </p:sp>
     </p:spTree>
     <p:extLst>
       <p:ext uri="{BB962C8B-B14F-4D97-AF65-F5344CB8AC3E}">
@@ -15935,6 +16915,35 @@
           </a:p>
         </p:txBody>
       </p:sp>
+      <p:sp>
+        <p:nvSpPr>
+          <p:cNvPr id="4" name="Slide Number Placeholder 3">
+            <a:extLst>
+              <a:ext uri="{FF2B5EF4-FFF2-40B4-BE49-F238E27FC236}">
+                <a16:creationId xmlns:a16="http://schemas.microsoft.com/office/drawing/2014/main" id="{13351860-E32E-F8E1-82DD-4E0515A1099C}"/>
+              </a:ext>
+            </a:extLst>
+          </p:cNvPr>
+          <p:cNvSpPr>
+            <a:spLocks noGrp="1"/>
+          </p:cNvSpPr>
+          <p:nvPr>
+            <p:ph type="sldNum" sz="quarter" idx="12"/>
+          </p:nvPr>
+        </p:nvSpPr>
+        <p:spPr/>
+        <p:txBody>
+          <a:bodyPr/>
+          <a:lstStyle/>
+          <a:p>
+            <a:fld id="{D39607A7-8386-47DB-8578-DDEDD194E5D4}" type="slidenum">
+              <a:rPr lang="en-US" smtClean="0"/>
+              <a:t>7</a:t>
+            </a:fld>
+            <a:endParaRPr lang="en-US"/>
+          </a:p>
+        </p:txBody>
+      </p:sp>
     </p:spTree>
     <p:extLst>
       <p:ext uri="{BB962C8B-B14F-4D97-AF65-F5344CB8AC3E}">
@@ -16067,7 +17076,7 @@
         </p:blipFill>
         <p:spPr>
           <a:xfrm>
-            <a:off x="2531600" y="1946909"/>
+            <a:off x="2525368" y="1881906"/>
             <a:ext cx="7134913" cy="4520093"/>
           </a:xfrm>
           <a:prstGeom prst="rect">
@@ -16075,6 +17084,70 @@
           </a:prstGeom>
         </p:spPr>
       </p:pic>
+      <p:sp>
+        <p:nvSpPr>
+          <p:cNvPr id="4" name="Slide Number Placeholder 3">
+            <a:extLst>
+              <a:ext uri="{FF2B5EF4-FFF2-40B4-BE49-F238E27FC236}">
+                <a16:creationId xmlns:a16="http://schemas.microsoft.com/office/drawing/2014/main" id="{BACC973F-C1D6-03AD-1737-3F01C6BC23DE}"/>
+              </a:ext>
+            </a:extLst>
+          </p:cNvPr>
+          <p:cNvSpPr>
+            <a:spLocks noGrp="1"/>
+          </p:cNvSpPr>
+          <p:nvPr>
+            <p:ph type="sldNum" sz="quarter" idx="12"/>
+          </p:nvPr>
+        </p:nvSpPr>
+        <p:spPr/>
+        <p:txBody>
+          <a:bodyPr/>
+          <a:lstStyle/>
+          <a:p>
+            <a:fld id="{D39607A7-8386-47DB-8578-DDEDD194E5D4}" type="slidenum">
+              <a:rPr lang="en-US" smtClean="0"/>
+              <a:t>8</a:t>
+            </a:fld>
+            <a:endParaRPr lang="en-US"/>
+          </a:p>
+        </p:txBody>
+      </p:sp>
+      <p:sp>
+        <p:nvSpPr>
+          <p:cNvPr id="6" name="TextBox 5">
+            <a:extLst>
+              <a:ext uri="{FF2B5EF4-FFF2-40B4-BE49-F238E27FC236}">
+                <a16:creationId xmlns:a16="http://schemas.microsoft.com/office/drawing/2014/main" id="{02F77D30-4B6A-6323-FD38-4CFDA706A9E4}"/>
+              </a:ext>
+            </a:extLst>
+          </p:cNvPr>
+          <p:cNvSpPr txBox="1"/>
+          <p:nvPr/>
+        </p:nvSpPr>
+        <p:spPr>
+          <a:xfrm>
+            <a:off x="2525368" y="6488668"/>
+            <a:ext cx="6083268" cy="369332"/>
+          </a:xfrm>
+          <a:prstGeom prst="rect">
+            <a:avLst/>
+          </a:prstGeom>
+          <a:noFill/>
+        </p:spPr>
+        <p:txBody>
+          <a:bodyPr wrap="none" rtlCol="0">
+            <a:spAutoFit/>
+          </a:bodyPr>
+          <a:lstStyle/>
+          <a:p>
+            <a:r>
+              <a:rPr lang="en-US" dirty="0"/>
+              <a:t>Fig 5 : Spam Email Classification Using Pre-Trained model</a:t>
+            </a:r>
+          </a:p>
+        </p:txBody>
+      </p:sp>
     </p:spTree>
     <p:extLst>
       <p:ext uri="{BB962C8B-B14F-4D97-AF65-F5344CB8AC3E}">
@@ -16273,6 +17346,117 @@
           </a:prstGeom>
         </p:spPr>
       </p:pic>
+      <p:sp>
+        <p:nvSpPr>
+          <p:cNvPr id="4" name="Slide Number Placeholder 3">
+            <a:extLst>
+              <a:ext uri="{FF2B5EF4-FFF2-40B4-BE49-F238E27FC236}">
+                <a16:creationId xmlns:a16="http://schemas.microsoft.com/office/drawing/2014/main" id="{E7F6C90D-F0FA-673A-7DD6-405DBA21918C}"/>
+              </a:ext>
+            </a:extLst>
+          </p:cNvPr>
+          <p:cNvSpPr>
+            <a:spLocks noGrp="1"/>
+          </p:cNvSpPr>
+          <p:nvPr>
+            <p:ph type="sldNum" sz="quarter" idx="12"/>
+          </p:nvPr>
+        </p:nvSpPr>
+        <p:spPr/>
+        <p:txBody>
+          <a:bodyPr/>
+          <a:lstStyle/>
+          <a:p>
+            <a:fld id="{D39607A7-8386-47DB-8578-DDEDD194E5D4}" type="slidenum">
+              <a:rPr lang="en-US" smtClean="0"/>
+              <a:t>9</a:t>
+            </a:fld>
+            <a:endParaRPr lang="en-US"/>
+          </a:p>
+        </p:txBody>
+      </p:sp>
+      <p:sp>
+        <p:nvSpPr>
+          <p:cNvPr id="5" name="TextBox 4">
+            <a:extLst>
+              <a:ext uri="{FF2B5EF4-FFF2-40B4-BE49-F238E27FC236}">
+                <a16:creationId xmlns:a16="http://schemas.microsoft.com/office/drawing/2014/main" id="{0F9E29F0-99CE-B268-85DA-50C8E339EC2A}"/>
+              </a:ext>
+            </a:extLst>
+          </p:cNvPr>
+          <p:cNvSpPr txBox="1"/>
+          <p:nvPr/>
+        </p:nvSpPr>
+        <p:spPr>
+          <a:xfrm>
+            <a:off x="1079500" y="6217333"/>
+            <a:ext cx="4540987" cy="646331"/>
+          </a:xfrm>
+          <a:prstGeom prst="rect">
+            <a:avLst/>
+          </a:prstGeom>
+          <a:noFill/>
+        </p:spPr>
+        <p:txBody>
+          <a:bodyPr wrap="none" rtlCol="0">
+            <a:spAutoFit/>
+          </a:bodyPr>
+          <a:lstStyle/>
+          <a:p>
+            <a:r>
+              <a:rPr lang="en-US" dirty="0"/>
+              <a:t>Fig 6 : Confusion matrix for the Pre-Trained</a:t>
+            </a:r>
+          </a:p>
+          <a:p>
+            <a:r>
+              <a:rPr lang="en-US" dirty="0"/>
+              <a:t>Classification model</a:t>
+            </a:r>
+          </a:p>
+        </p:txBody>
+      </p:sp>
+      <p:sp>
+        <p:nvSpPr>
+          <p:cNvPr id="6" name="TextBox 5">
+            <a:extLst>
+              <a:ext uri="{FF2B5EF4-FFF2-40B4-BE49-F238E27FC236}">
+                <a16:creationId xmlns:a16="http://schemas.microsoft.com/office/drawing/2014/main" id="{1AB3D925-31B3-A0EC-931D-7B8434E0A2F5}"/>
+              </a:ext>
+            </a:extLst>
+          </p:cNvPr>
+          <p:cNvSpPr txBox="1"/>
+          <p:nvPr/>
+        </p:nvSpPr>
+        <p:spPr>
+          <a:xfrm>
+            <a:off x="6557639" y="5182564"/>
+            <a:ext cx="4946803" cy="646331"/>
+          </a:xfrm>
+          <a:prstGeom prst="rect">
+            <a:avLst/>
+          </a:prstGeom>
+          <a:noFill/>
+        </p:spPr>
+        <p:txBody>
+          <a:bodyPr wrap="none" rtlCol="0">
+            <a:spAutoFit/>
+          </a:bodyPr>
+          <a:lstStyle/>
+          <a:p>
+            <a:r>
+              <a:rPr lang="en-US" dirty="0"/>
+              <a:t>Fig 7 : Classification Report for the Pre-Trained </a:t>
+            </a:r>
+          </a:p>
+          <a:p>
+            <a:r>
+              <a:rPr lang="en-US" dirty="0"/>
+              <a:t>model</a:t>
+            </a:r>
+          </a:p>
+        </p:txBody>
+      </p:sp>
     </p:spTree>
     <p:extLst>
       <p:ext uri="{BB962C8B-B14F-4D97-AF65-F5344CB8AC3E}">
@@ -16454,4 +17638,299 @@
     </a:ext>
   </a:extLst>
 </a:theme>
+</file>
+
+<file path=ppt/theme/theme2.xml><?xml version="1.0" encoding="utf-8"?>
+<a:theme xmlns:a="http://schemas.openxmlformats.org/drawingml/2006/main" name="Office Theme">
+  <a:themeElements>
+    <a:clrScheme name="Office">
+      <a:dk1>
+        <a:sysClr val="windowText" lastClr="000000"/>
+      </a:dk1>
+      <a:lt1>
+        <a:sysClr val="window" lastClr="FFFFFF"/>
+      </a:lt1>
+      <a:dk2>
+        <a:srgbClr val="44546A"/>
+      </a:dk2>
+      <a:lt2>
+        <a:srgbClr val="E7E6E6"/>
+      </a:lt2>
+      <a:accent1>
+        <a:srgbClr val="4472C4"/>
+      </a:accent1>
+      <a:accent2>
+        <a:srgbClr val="ED7D31"/>
+      </a:accent2>
+      <a:accent3>
+        <a:srgbClr val="A5A5A5"/>
+      </a:accent3>
+      <a:accent4>
+        <a:srgbClr val="FFC000"/>
+      </a:accent4>
+      <a:accent5>
+        <a:srgbClr val="5B9BD5"/>
+      </a:accent5>
+      <a:accent6>
+        <a:srgbClr val="70AD47"/>
+      </a:accent6>
+      <a:hlink>
+        <a:srgbClr val="0563C1"/>
+      </a:hlink>
+      <a:folHlink>
+        <a:srgbClr val="954F72"/>
+      </a:folHlink>
+    </a:clrScheme>
+    <a:fontScheme name="Office">
+      <a:majorFont>
+        <a:latin typeface="Calibri Light" panose="020F0302020204030204"/>
+        <a:ea typeface=""/>
+        <a:cs typeface=""/>
+        <a:font script="Jpan" typeface="游ゴシック Light"/>
+        <a:font script="Hang" typeface="맑은 고딕"/>
+        <a:font script="Hans" typeface="等线 Light"/>
+        <a:font script="Hant" typeface="新細明體"/>
+        <a:font script="Arab" typeface="Times New Roman"/>
+        <a:font script="Hebr" typeface="Times New Roman"/>
+        <a:font script="Thai" typeface="Angsana New"/>
+        <a:font script="Ethi" typeface="Nyala"/>
+        <a:font script="Beng" typeface="Vrinda"/>
+        <a:font script="Gujr" typeface="Shruti"/>
+        <a:font script="Khmr" typeface="MoolBoran"/>
+        <a:font script="Knda" typeface="Tunga"/>
+        <a:font script="Guru" typeface="Raavi"/>
+        <a:font script="Cans" typeface="Euphemia"/>
+        <a:font script="Cher" typeface="Plantagenet Cherokee"/>
+        <a:font script="Yiii" typeface="Microsoft Yi Baiti"/>
+        <a:font script="Tibt" typeface="Microsoft Himalaya"/>
+        <a:font script="Thaa" typeface="MV Boli"/>
+        <a:font script="Deva" typeface="Mangal"/>
+        <a:font script="Telu" typeface="Gautami"/>
+        <a:font script="Taml" typeface="Latha"/>
+        <a:font script="Syrc" typeface="Estrangelo Edessa"/>
+        <a:font script="Orya" typeface="Kalinga"/>
+        <a:font script="Mlym" typeface="Kartika"/>
+        <a:font script="Laoo" typeface="DokChampa"/>
+        <a:font script="Sinh" typeface="Iskoola Pota"/>
+        <a:font script="Mong" typeface="Mongolian Baiti"/>
+        <a:font script="Viet" typeface="Times New Roman"/>
+        <a:font script="Uigh" typeface="Microsoft Uighur"/>
+        <a:font script="Geor" typeface="Sylfaen"/>
+        <a:font script="Armn" typeface="Arial"/>
+        <a:font script="Bugi" typeface="Leelawadee UI"/>
+        <a:font script="Bopo" typeface="Microsoft JhengHei"/>
+        <a:font script="Java" typeface="Javanese Text"/>
+        <a:font script="Lisu" typeface="Segoe UI"/>
+        <a:font script="Mymr" typeface="Myanmar Text"/>
+        <a:font script="Nkoo" typeface="Ebrima"/>
+        <a:font script="Olck" typeface="Nirmala UI"/>
+        <a:font script="Osma" typeface="Ebrima"/>
+        <a:font script="Phag" typeface="Phagspa"/>
+        <a:font script="Syrn" typeface="Estrangelo Edessa"/>
+        <a:font script="Syrj" typeface="Estrangelo Edessa"/>
+        <a:font script="Syre" typeface="Estrangelo Edessa"/>
+        <a:font script="Sora" typeface="Nirmala UI"/>
+        <a:font script="Tale" typeface="Microsoft Tai Le"/>
+        <a:font script="Talu" typeface="Microsoft New Tai Lue"/>
+        <a:font script="Tfng" typeface="Ebrima"/>
+      </a:majorFont>
+      <a:minorFont>
+        <a:latin typeface="Calibri" panose="020F0502020204030204"/>
+        <a:ea typeface=""/>
+        <a:cs typeface=""/>
+        <a:font script="Jpan" typeface="游ゴシック"/>
+        <a:font script="Hang" typeface="맑은 고딕"/>
+        <a:font script="Hans" typeface="等线"/>
+        <a:font script="Hant" typeface="新細明體"/>
+        <a:font script="Arab" typeface="Arial"/>
+        <a:font script="Hebr" typeface="Arial"/>
+        <a:font script="Thai" typeface="Cordia New"/>
+        <a:font script="Ethi" typeface="Nyala"/>
+        <a:font script="Beng" typeface="Vrinda"/>
+        <a:font script="Gujr" typeface="Shruti"/>
+        <a:font script="Khmr" typeface="DaunPenh"/>
+        <a:font script="Knda" typeface="Tunga"/>
+        <a:font script="Guru" typeface="Raavi"/>
+        <a:font script="Cans" typeface="Euphemia"/>
+        <a:font script="Cher" typeface="Plantagenet Cherokee"/>
+        <a:font script="Yiii" typeface="Microsoft Yi Baiti"/>
+        <a:font script="Tibt" typeface="Microsoft Himalaya"/>
+        <a:font script="Thaa" typeface="MV Boli"/>
+        <a:font script="Deva" typeface="Mangal"/>
+        <a:font script="Telu" typeface="Gautami"/>
+        <a:font script="Taml" typeface="Latha"/>
+        <a:font script="Syrc" typeface="Estrangelo Edessa"/>
+        <a:font script="Orya" typeface="Kalinga"/>
+        <a:font script="Mlym" typeface="Kartika"/>
+        <a:font script="Laoo" typeface="DokChampa"/>
+        <a:font script="Sinh" typeface="Iskoola Pota"/>
+        <a:font script="Mong" typeface="Mongolian Baiti"/>
+        <a:font script="Viet" typeface="Arial"/>
+        <a:font script="Uigh" typeface="Microsoft Uighur"/>
+        <a:font script="Geor" typeface="Sylfaen"/>
+        <a:font script="Armn" typeface="Arial"/>
+        <a:font script="Bugi" typeface="Leelawadee UI"/>
+        <a:font script="Bopo" typeface="Microsoft JhengHei"/>
+        <a:font script="Java" typeface="Javanese Text"/>
+        <a:font script="Lisu" typeface="Segoe UI"/>
+        <a:font script="Mymr" typeface="Myanmar Text"/>
+        <a:font script="Nkoo" typeface="Ebrima"/>
+        <a:font script="Olck" typeface="Nirmala UI"/>
+        <a:font script="Osma" typeface="Ebrima"/>
+        <a:font script="Phag" typeface="Phagspa"/>
+        <a:font script="Syrn" typeface="Estrangelo Edessa"/>
+        <a:font script="Syrj" typeface="Estrangelo Edessa"/>
+        <a:font script="Syre" typeface="Estrangelo Edessa"/>
+        <a:font script="Sora" typeface="Nirmala UI"/>
+        <a:font script="Tale" typeface="Microsoft Tai Le"/>
+        <a:font script="Talu" typeface="Microsoft New Tai Lue"/>
+        <a:font script="Tfng" typeface="Ebrima"/>
+      </a:minorFont>
+    </a:fontScheme>
+    <a:fmtScheme name="Office">
+      <a:fillStyleLst>
+        <a:solidFill>
+          <a:schemeClr val="phClr"/>
+        </a:solidFill>
+        <a:gradFill rotWithShape="1">
+          <a:gsLst>
+            <a:gs pos="0">
+              <a:schemeClr val="phClr">
+                <a:lumMod val="110000"/>
+                <a:satMod val="105000"/>
+                <a:tint val="67000"/>
+              </a:schemeClr>
+            </a:gs>
+            <a:gs pos="50000">
+              <a:schemeClr val="phClr">
+                <a:lumMod val="105000"/>
+                <a:satMod val="103000"/>
+                <a:tint val="73000"/>
+              </a:schemeClr>
+            </a:gs>
+            <a:gs pos="100000">
+              <a:schemeClr val="phClr">
+                <a:lumMod val="105000"/>
+                <a:satMod val="109000"/>
+                <a:tint val="81000"/>
+              </a:schemeClr>
+            </a:gs>
+          </a:gsLst>
+          <a:lin ang="5400000" scaled="0"/>
+        </a:gradFill>
+        <a:gradFill rotWithShape="1">
+          <a:gsLst>
+            <a:gs pos="0">
+              <a:schemeClr val="phClr">
+                <a:satMod val="103000"/>
+                <a:lumMod val="102000"/>
+                <a:tint val="94000"/>
+              </a:schemeClr>
+            </a:gs>
+            <a:gs pos="50000">
+              <a:schemeClr val="phClr">
+                <a:satMod val="110000"/>
+                <a:lumMod val="100000"/>
+                <a:shade val="100000"/>
+              </a:schemeClr>
+            </a:gs>
+            <a:gs pos="100000">
+              <a:schemeClr val="phClr">
+                <a:lumMod val="99000"/>
+                <a:satMod val="120000"/>
+                <a:shade val="78000"/>
+              </a:schemeClr>
+            </a:gs>
+          </a:gsLst>
+          <a:lin ang="5400000" scaled="0"/>
+        </a:gradFill>
+      </a:fillStyleLst>
+      <a:lnStyleLst>
+        <a:ln w="6350" cap="flat" cmpd="sng" algn="ctr">
+          <a:solidFill>
+            <a:schemeClr val="phClr"/>
+          </a:solidFill>
+          <a:prstDash val="solid"/>
+          <a:miter lim="800000"/>
+        </a:ln>
+        <a:ln w="12700" cap="flat" cmpd="sng" algn="ctr">
+          <a:solidFill>
+            <a:schemeClr val="phClr"/>
+          </a:solidFill>
+          <a:prstDash val="solid"/>
+          <a:miter lim="800000"/>
+        </a:ln>
+        <a:ln w="19050" cap="flat" cmpd="sng" algn="ctr">
+          <a:solidFill>
+            <a:schemeClr val="phClr"/>
+          </a:solidFill>
+          <a:prstDash val="solid"/>
+          <a:miter lim="800000"/>
+        </a:ln>
+      </a:lnStyleLst>
+      <a:effectStyleLst>
+        <a:effectStyle>
+          <a:effectLst/>
+        </a:effectStyle>
+        <a:effectStyle>
+          <a:effectLst/>
+        </a:effectStyle>
+        <a:effectStyle>
+          <a:effectLst>
+            <a:outerShdw blurRad="57150" dist="19050" dir="5400000" algn="ctr" rotWithShape="0">
+              <a:srgbClr val="000000">
+                <a:alpha val="63000"/>
+              </a:srgbClr>
+            </a:outerShdw>
+          </a:effectLst>
+        </a:effectStyle>
+      </a:effectStyleLst>
+      <a:bgFillStyleLst>
+        <a:solidFill>
+          <a:schemeClr val="phClr"/>
+        </a:solidFill>
+        <a:solidFill>
+          <a:schemeClr val="phClr">
+            <a:tint val="95000"/>
+            <a:satMod val="170000"/>
+          </a:schemeClr>
+        </a:solidFill>
+        <a:gradFill rotWithShape="1">
+          <a:gsLst>
+            <a:gs pos="0">
+              <a:schemeClr val="phClr">
+                <a:tint val="93000"/>
+                <a:satMod val="150000"/>
+                <a:shade val="98000"/>
+                <a:lumMod val="102000"/>
+              </a:schemeClr>
+            </a:gs>
+            <a:gs pos="50000">
+              <a:schemeClr val="phClr">
+                <a:tint val="98000"/>
+                <a:satMod val="130000"/>
+                <a:shade val="90000"/>
+                <a:lumMod val="103000"/>
+              </a:schemeClr>
+            </a:gs>
+            <a:gs pos="100000">
+              <a:schemeClr val="phClr">
+                <a:shade val="63000"/>
+                <a:satMod val="120000"/>
+              </a:schemeClr>
+            </a:gs>
+          </a:gsLst>
+          <a:lin ang="5400000" scaled="0"/>
+        </a:gradFill>
+      </a:bgFillStyleLst>
+    </a:fmtScheme>
+  </a:themeElements>
+  <a:objectDefaults/>
+  <a:extraClrSchemeLst/>
+  <a:extLst>
+    <a:ext uri="{05A4C25C-085E-4340-85A3-A5531E510DB2}">
+      <thm15:themeFamily xmlns:thm15="http://schemas.microsoft.com/office/thememl/2012/main" name="Office Theme" id="{62F939B6-93AF-4DB8-9C6B-D6C7DFDC589F}" vid="{4A3C46E8-61CC-4603-A589-7422A47A8E4A}"/>
+    </a:ext>
+  </a:extLst>
+</a:theme>
 </file>
</xml_diff>